<commit_message>
Added Security. I have secured the endpoints.
</commit_message>
<xml_diff>
--- a/Java backend engineering.pptx
+++ b/Java backend engineering.pptx
@@ -104,6 +104,11 @@
       </a:defRPr>
     </a:lvl9pPr>
   </p:defaultTextStyle>
+  <p:extLst>
+    <p:ext uri="{EFAFB233-063F-42B5-8137-9DF3F51BA10A}">
+      <p15:sldGuideLst xmlns:p15="http://schemas.microsoft.com/office/powerpoint/2012/main"/>
+    </p:ext>
+  </p:extLst>
 </p:presentation>
 </file>
 
@@ -298,7 +303,7 @@
           <a:p>
             <a:fld id="{C91AADE8-F9E2-4EB5-95E2-D54CD91203C8}" type="datetimeFigureOut">
               <a:rPr lang="en-ZA" smtClean="0"/>
-              <a:t>2023/02/09</a:t>
+              <a:t>2023/02/11</a:t>
             </a:fld>
             <a:endParaRPr lang="en-ZA"/>
           </a:p>
@@ -734,7 +739,7 @@
           <a:p>
             <a:fld id="{C91AADE8-F9E2-4EB5-95E2-D54CD91203C8}" type="datetimeFigureOut">
               <a:rPr lang="en-ZA" smtClean="0"/>
-              <a:t>2023/02/09</a:t>
+              <a:t>2023/02/11</a:t>
             </a:fld>
             <a:endParaRPr lang="en-ZA"/>
           </a:p>
@@ -984,7 +989,7 @@
           <a:p>
             <a:fld id="{C91AADE8-F9E2-4EB5-95E2-D54CD91203C8}" type="datetimeFigureOut">
               <a:rPr lang="en-ZA" smtClean="0"/>
-              <a:t>2023/02/09</a:t>
+              <a:t>2023/02/11</a:t>
             </a:fld>
             <a:endParaRPr lang="en-ZA"/>
           </a:p>
@@ -1292,7 +1297,7 @@
           <a:p>
             <a:fld id="{C91AADE8-F9E2-4EB5-95E2-D54CD91203C8}" type="datetimeFigureOut">
               <a:rPr lang="en-ZA" smtClean="0"/>
-              <a:t>2023/02/09</a:t>
+              <a:t>2023/02/11</a:t>
             </a:fld>
             <a:endParaRPr lang="en-ZA"/>
           </a:p>
@@ -1610,7 +1615,7 @@
           <a:p>
             <a:fld id="{C91AADE8-F9E2-4EB5-95E2-D54CD91203C8}" type="datetimeFigureOut">
               <a:rPr lang="en-ZA" smtClean="0"/>
-              <a:t>2023/02/09</a:t>
+              <a:t>2023/02/11</a:t>
             </a:fld>
             <a:endParaRPr lang="en-ZA"/>
           </a:p>
@@ -1912,7 +1917,7 @@
           <a:p>
             <a:fld id="{C91AADE8-F9E2-4EB5-95E2-D54CD91203C8}" type="datetimeFigureOut">
               <a:rPr lang="en-ZA" smtClean="0"/>
-              <a:t>2023/02/09</a:t>
+              <a:t>2023/02/11</a:t>
             </a:fld>
             <a:endParaRPr lang="en-ZA"/>
           </a:p>
@@ -2279,7 +2284,7 @@
           <a:p>
             <a:fld id="{C91AADE8-F9E2-4EB5-95E2-D54CD91203C8}" type="datetimeFigureOut">
               <a:rPr lang="en-ZA" smtClean="0"/>
-              <a:t>2023/02/09</a:t>
+              <a:t>2023/02/11</a:t>
             </a:fld>
             <a:endParaRPr lang="en-ZA"/>
           </a:p>
@@ -2453,7 +2458,7 @@
           <a:p>
             <a:fld id="{C91AADE8-F9E2-4EB5-95E2-D54CD91203C8}" type="datetimeFigureOut">
               <a:rPr lang="en-ZA" smtClean="0"/>
-              <a:t>2023/02/09</a:t>
+              <a:t>2023/02/11</a:t>
             </a:fld>
             <a:endParaRPr lang="en-ZA"/>
           </a:p>
@@ -2633,7 +2638,7 @@
           <a:p>
             <a:fld id="{C91AADE8-F9E2-4EB5-95E2-D54CD91203C8}" type="datetimeFigureOut">
               <a:rPr lang="en-ZA" smtClean="0"/>
-              <a:t>2023/02/09</a:t>
+              <a:t>2023/02/11</a:t>
             </a:fld>
             <a:endParaRPr lang="en-ZA"/>
           </a:p>
@@ -2803,7 +2808,7 @@
           <a:p>
             <a:fld id="{C91AADE8-F9E2-4EB5-95E2-D54CD91203C8}" type="datetimeFigureOut">
               <a:rPr lang="en-ZA" smtClean="0"/>
-              <a:t>2023/02/09</a:t>
+              <a:t>2023/02/11</a:t>
             </a:fld>
             <a:endParaRPr lang="en-ZA"/>
           </a:p>
@@ -3053,7 +3058,7 @@
           <a:p>
             <a:fld id="{C91AADE8-F9E2-4EB5-95E2-D54CD91203C8}" type="datetimeFigureOut">
               <a:rPr lang="en-ZA" smtClean="0"/>
-              <a:t>2023/02/09</a:t>
+              <a:t>2023/02/11</a:t>
             </a:fld>
             <a:endParaRPr lang="en-ZA"/>
           </a:p>
@@ -3289,7 +3294,7 @@
           <a:p>
             <a:fld id="{C91AADE8-F9E2-4EB5-95E2-D54CD91203C8}" type="datetimeFigureOut">
               <a:rPr lang="en-ZA" smtClean="0"/>
-              <a:t>2023/02/09</a:t>
+              <a:t>2023/02/11</a:t>
             </a:fld>
             <a:endParaRPr lang="en-ZA"/>
           </a:p>
@@ -3671,7 +3676,7 @@
           <a:p>
             <a:fld id="{C91AADE8-F9E2-4EB5-95E2-D54CD91203C8}" type="datetimeFigureOut">
               <a:rPr lang="en-ZA" smtClean="0"/>
-              <a:t>2023/02/09</a:t>
+              <a:t>2023/02/11</a:t>
             </a:fld>
             <a:endParaRPr lang="en-ZA"/>
           </a:p>
@@ -3789,7 +3794,7 @@
           <a:p>
             <a:fld id="{C91AADE8-F9E2-4EB5-95E2-D54CD91203C8}" type="datetimeFigureOut">
               <a:rPr lang="en-ZA" smtClean="0"/>
-              <a:t>2023/02/09</a:t>
+              <a:t>2023/02/11</a:t>
             </a:fld>
             <a:endParaRPr lang="en-ZA"/>
           </a:p>
@@ -3884,7 +3889,7 @@
           <a:p>
             <a:fld id="{C91AADE8-F9E2-4EB5-95E2-D54CD91203C8}" type="datetimeFigureOut">
               <a:rPr lang="en-ZA" smtClean="0"/>
-              <a:t>2023/02/09</a:t>
+              <a:t>2023/02/11</a:t>
             </a:fld>
             <a:endParaRPr lang="en-ZA"/>
           </a:p>
@@ -4139,7 +4144,7 @@
           <a:p>
             <a:fld id="{C91AADE8-F9E2-4EB5-95E2-D54CD91203C8}" type="datetimeFigureOut">
               <a:rPr lang="en-ZA" smtClean="0"/>
-              <a:t>2023/02/09</a:t>
+              <a:t>2023/02/11</a:t>
             </a:fld>
             <a:endParaRPr lang="en-ZA"/>
           </a:p>
@@ -4422,7 +4427,7 @@
           <a:p>
             <a:fld id="{C91AADE8-F9E2-4EB5-95E2-D54CD91203C8}" type="datetimeFigureOut">
               <a:rPr lang="en-ZA" smtClean="0"/>
-              <a:t>2023/02/09</a:t>
+              <a:t>2023/02/11</a:t>
             </a:fld>
             <a:endParaRPr lang="en-ZA"/>
           </a:p>
@@ -4828,7 +4833,7 @@
           <a:p>
             <a:fld id="{C91AADE8-F9E2-4EB5-95E2-D54CD91203C8}" type="datetimeFigureOut">
               <a:rPr lang="en-ZA" smtClean="0"/>
-              <a:t>2023/02/09</a:t>
+              <a:t>2023/02/11</a:t>
             </a:fld>
             <a:endParaRPr lang="en-ZA"/>
           </a:p>
@@ -5531,17 +5536,26 @@
         </p:nvSpPr>
         <p:spPr>
           <a:xfrm>
-            <a:off x="684212" y="685799"/>
-            <a:ext cx="9678988" cy="3673474"/>
+            <a:off x="3176" y="0"/>
+            <a:ext cx="12185649" cy="511277"/>
           </a:xfrm>
         </p:spPr>
         <p:txBody>
           <a:bodyPr>
-            <a:normAutofit/>
+            <a:normAutofit fontScale="90000"/>
           </a:bodyPr>
           <a:lstStyle/>
           <a:p>
-            <a:endParaRPr lang="en-ZA" sz="6000">
+            <a:pPr algn="ctr"/>
+            <a:r>
+              <a:rPr lang="en-US" sz="3200" dirty="0">
+                <a:solidFill>
+                  <a:schemeClr val="tx2"/>
+                </a:solidFill>
+              </a:rPr>
+              <a:t>Pokémon CI/CD Architecture</a:t>
+            </a:r>
+            <a:endParaRPr lang="en-ZA" sz="3200" dirty="0">
               <a:solidFill>
                 <a:schemeClr val="tx2"/>
               </a:solidFill>

</xml_diff>

<commit_message>
Added Fix For Sonar Lint Added Common response for exceptional handling
</commit_message>
<xml_diff>
--- a/Java backend engineering.pptx
+++ b/Java backend engineering.pptx
@@ -303,7 +303,7 @@
           <a:p>
             <a:fld id="{C91AADE8-F9E2-4EB5-95E2-D54CD91203C8}" type="datetimeFigureOut">
               <a:rPr lang="en-ZA" smtClean="0"/>
-              <a:t>2023/02/11</a:t>
+              <a:t>2023/02/13</a:t>
             </a:fld>
             <a:endParaRPr lang="en-ZA"/>
           </a:p>
@@ -739,7 +739,7 @@
           <a:p>
             <a:fld id="{C91AADE8-F9E2-4EB5-95E2-D54CD91203C8}" type="datetimeFigureOut">
               <a:rPr lang="en-ZA" smtClean="0"/>
-              <a:t>2023/02/11</a:t>
+              <a:t>2023/02/13</a:t>
             </a:fld>
             <a:endParaRPr lang="en-ZA"/>
           </a:p>
@@ -989,7 +989,7 @@
           <a:p>
             <a:fld id="{C91AADE8-F9E2-4EB5-95E2-D54CD91203C8}" type="datetimeFigureOut">
               <a:rPr lang="en-ZA" smtClean="0"/>
-              <a:t>2023/02/11</a:t>
+              <a:t>2023/02/13</a:t>
             </a:fld>
             <a:endParaRPr lang="en-ZA"/>
           </a:p>
@@ -1297,7 +1297,7 @@
           <a:p>
             <a:fld id="{C91AADE8-F9E2-4EB5-95E2-D54CD91203C8}" type="datetimeFigureOut">
               <a:rPr lang="en-ZA" smtClean="0"/>
-              <a:t>2023/02/11</a:t>
+              <a:t>2023/02/13</a:t>
             </a:fld>
             <a:endParaRPr lang="en-ZA"/>
           </a:p>
@@ -1615,7 +1615,7 @@
           <a:p>
             <a:fld id="{C91AADE8-F9E2-4EB5-95E2-D54CD91203C8}" type="datetimeFigureOut">
               <a:rPr lang="en-ZA" smtClean="0"/>
-              <a:t>2023/02/11</a:t>
+              <a:t>2023/02/13</a:t>
             </a:fld>
             <a:endParaRPr lang="en-ZA"/>
           </a:p>
@@ -1917,7 +1917,7 @@
           <a:p>
             <a:fld id="{C91AADE8-F9E2-4EB5-95E2-D54CD91203C8}" type="datetimeFigureOut">
               <a:rPr lang="en-ZA" smtClean="0"/>
-              <a:t>2023/02/11</a:t>
+              <a:t>2023/02/13</a:t>
             </a:fld>
             <a:endParaRPr lang="en-ZA"/>
           </a:p>
@@ -2284,7 +2284,7 @@
           <a:p>
             <a:fld id="{C91AADE8-F9E2-4EB5-95E2-D54CD91203C8}" type="datetimeFigureOut">
               <a:rPr lang="en-ZA" smtClean="0"/>
-              <a:t>2023/02/11</a:t>
+              <a:t>2023/02/13</a:t>
             </a:fld>
             <a:endParaRPr lang="en-ZA"/>
           </a:p>
@@ -2458,7 +2458,7 @@
           <a:p>
             <a:fld id="{C91AADE8-F9E2-4EB5-95E2-D54CD91203C8}" type="datetimeFigureOut">
               <a:rPr lang="en-ZA" smtClean="0"/>
-              <a:t>2023/02/11</a:t>
+              <a:t>2023/02/13</a:t>
             </a:fld>
             <a:endParaRPr lang="en-ZA"/>
           </a:p>
@@ -2638,7 +2638,7 @@
           <a:p>
             <a:fld id="{C91AADE8-F9E2-4EB5-95E2-D54CD91203C8}" type="datetimeFigureOut">
               <a:rPr lang="en-ZA" smtClean="0"/>
-              <a:t>2023/02/11</a:t>
+              <a:t>2023/02/13</a:t>
             </a:fld>
             <a:endParaRPr lang="en-ZA"/>
           </a:p>
@@ -2808,7 +2808,7 @@
           <a:p>
             <a:fld id="{C91AADE8-F9E2-4EB5-95E2-D54CD91203C8}" type="datetimeFigureOut">
               <a:rPr lang="en-ZA" smtClean="0"/>
-              <a:t>2023/02/11</a:t>
+              <a:t>2023/02/13</a:t>
             </a:fld>
             <a:endParaRPr lang="en-ZA"/>
           </a:p>
@@ -3058,7 +3058,7 @@
           <a:p>
             <a:fld id="{C91AADE8-F9E2-4EB5-95E2-D54CD91203C8}" type="datetimeFigureOut">
               <a:rPr lang="en-ZA" smtClean="0"/>
-              <a:t>2023/02/11</a:t>
+              <a:t>2023/02/13</a:t>
             </a:fld>
             <a:endParaRPr lang="en-ZA"/>
           </a:p>
@@ -3294,7 +3294,7 @@
           <a:p>
             <a:fld id="{C91AADE8-F9E2-4EB5-95E2-D54CD91203C8}" type="datetimeFigureOut">
               <a:rPr lang="en-ZA" smtClean="0"/>
-              <a:t>2023/02/11</a:t>
+              <a:t>2023/02/13</a:t>
             </a:fld>
             <a:endParaRPr lang="en-ZA"/>
           </a:p>
@@ -3676,7 +3676,7 @@
           <a:p>
             <a:fld id="{C91AADE8-F9E2-4EB5-95E2-D54CD91203C8}" type="datetimeFigureOut">
               <a:rPr lang="en-ZA" smtClean="0"/>
-              <a:t>2023/02/11</a:t>
+              <a:t>2023/02/13</a:t>
             </a:fld>
             <a:endParaRPr lang="en-ZA"/>
           </a:p>
@@ -3794,7 +3794,7 @@
           <a:p>
             <a:fld id="{C91AADE8-F9E2-4EB5-95E2-D54CD91203C8}" type="datetimeFigureOut">
               <a:rPr lang="en-ZA" smtClean="0"/>
-              <a:t>2023/02/11</a:t>
+              <a:t>2023/02/13</a:t>
             </a:fld>
             <a:endParaRPr lang="en-ZA"/>
           </a:p>
@@ -3889,7 +3889,7 @@
           <a:p>
             <a:fld id="{C91AADE8-F9E2-4EB5-95E2-D54CD91203C8}" type="datetimeFigureOut">
               <a:rPr lang="en-ZA" smtClean="0"/>
-              <a:t>2023/02/11</a:t>
+              <a:t>2023/02/13</a:t>
             </a:fld>
             <a:endParaRPr lang="en-ZA"/>
           </a:p>
@@ -4144,7 +4144,7 @@
           <a:p>
             <a:fld id="{C91AADE8-F9E2-4EB5-95E2-D54CD91203C8}" type="datetimeFigureOut">
               <a:rPr lang="en-ZA" smtClean="0"/>
-              <a:t>2023/02/11</a:t>
+              <a:t>2023/02/13</a:t>
             </a:fld>
             <a:endParaRPr lang="en-ZA"/>
           </a:p>
@@ -4427,7 +4427,7 @@
           <a:p>
             <a:fld id="{C91AADE8-F9E2-4EB5-95E2-D54CD91203C8}" type="datetimeFigureOut">
               <a:rPr lang="en-ZA" smtClean="0"/>
-              <a:t>2023/02/11</a:t>
+              <a:t>2023/02/13</a:t>
             </a:fld>
             <a:endParaRPr lang="en-ZA"/>
           </a:p>
@@ -4833,7 +4833,7 @@
           <a:p>
             <a:fld id="{C91AADE8-F9E2-4EB5-95E2-D54CD91203C8}" type="datetimeFigureOut">
               <a:rPr lang="en-ZA" smtClean="0"/>
-              <a:t>2023/02/11</a:t>
+              <a:t>2023/02/13</a:t>
             </a:fld>
             <a:endParaRPr lang="en-ZA"/>
           </a:p>
@@ -5563,6 +5563,42 @@
           </a:p>
         </p:txBody>
       </p:sp>
+      <p:pic>
+        <p:nvPicPr>
+          <p:cNvPr id="4" name="Picture 3" descr="Diagram&#10;&#10;Description automatically generated">
+            <a:extLst>
+              <a:ext uri="{FF2B5EF4-FFF2-40B4-BE49-F238E27FC236}">
+                <a16:creationId xmlns:a16="http://schemas.microsoft.com/office/drawing/2014/main" id="{8541CAFC-2642-45A7-B7B0-7369227A3251}"/>
+              </a:ext>
+            </a:extLst>
+          </p:cNvPr>
+          <p:cNvPicPr>
+            <a:picLocks noChangeAspect="1"/>
+          </p:cNvPicPr>
+          <p:nvPr/>
+        </p:nvPicPr>
+        <p:blipFill>
+          <a:blip r:embed="rId2">
+            <a:extLst>
+              <a:ext uri="{28A0092B-C50C-407E-A947-70E740481C1C}">
+                <a14:useLocalDpi xmlns:a14="http://schemas.microsoft.com/office/drawing/2010/main" val="0"/>
+              </a:ext>
+            </a:extLst>
+          </a:blip>
+          <a:stretch>
+            <a:fillRect/>
+          </a:stretch>
+        </p:blipFill>
+        <p:spPr>
+          <a:xfrm>
+            <a:off x="-3175" y="629265"/>
+            <a:ext cx="12195175" cy="6228735"/>
+          </a:xfrm>
+          <a:prstGeom prst="rect">
+            <a:avLst/>
+          </a:prstGeom>
+        </p:spPr>
+      </p:pic>
     </p:spTree>
     <p:extLst>
       <p:ext uri="{BB962C8B-B14F-4D97-AF65-F5344CB8AC3E}">

</xml_diff>